<commit_message>
IM Asset UI changes
</commit_message>
<xml_diff>
--- a/assets/screens/newdesign/ADW+DVD for ALL LOBs - Introduction.pptx
+++ b/assets/screens/newdesign/ADW+DVD for ALL LOBs - Introduction.pptx
@@ -257,7 +257,7 @@
           <a:p>
             <a:fld id="{CE859F61-E769-E04B-9176-024CACC0559F}" type="datetime1">
               <a:rPr lang="en-IN" smtClean="0"/>
-              <a:t>28-05-2019</a:t>
+              <a:t>03-06-2019</a:t>
             </a:fld>
             <a:endParaRPr lang="en-US"/>
           </a:p>
@@ -423,7 +423,7 @@
           <a:p>
             <a:fld id="{A9FA2C70-E289-E542-8D34-0A9BC9C4D3CB}" type="datetime1">
               <a:rPr lang="en-IN" smtClean="0"/>
-              <a:t>28-05-2019</a:t>
+              <a:t>03-06-2019</a:t>
             </a:fld>
             <a:endParaRPr lang="en-US"/>
           </a:p>
@@ -2907,7 +2907,7 @@
           <p:nvPr>
             <p:extLst>
               <p:ext uri="{D42A27DB-BD31-4B8C-83A1-F6EECF244321}">
-                <p14:modId xmlns:p14="http://schemas.microsoft.com/office/powerpoint/2010/main" val="3359036864"/>
+                <p14:modId xmlns:p14="http://schemas.microsoft.com/office/powerpoint/2010/main" val="3286216134"/>
               </p:ext>
             </p:extLst>
           </p:nvPr>
@@ -2997,20 +2997,14 @@
                     <a:p>
                       <a:pPr algn="ctr"/>
                       <a:r>
-                        <a:rPr lang="en-US" sz="1600" dirty="0">
+                        <a:rPr lang="en-US" sz="1600" smtClean="0">
                           <a:latin typeface="+mn-lt"/>
                         </a:rPr>
                         <a:t>Video</a:t>
                       </a:r>
-                    </a:p>
-                    <a:p>
-                      <a:pPr algn="ctr"/>
-                      <a:r>
-                        <a:rPr lang="en-US" sz="1600" dirty="0">
-                          <a:latin typeface="+mn-lt"/>
-                        </a:rPr>
-                        <a:t>3:26</a:t>
-                      </a:r>
+                      <a:endParaRPr lang="en-US" sz="1600" dirty="0">
+                        <a:latin typeface="+mn-lt"/>
+                      </a:endParaRPr>
                     </a:p>
                   </a:txBody>
                   <a:tcPr anchor="ctr"/>

</xml_diff>